<commit_message>
Update Prezentare TWAAOS Login Iulian Ivascu.pptx
</commit_message>
<xml_diff>
--- a/Prezentare TWAAOS Login Iulian Ivascu.pptx
+++ b/Prezentare TWAAOS Login Iulian Ivascu.pptx
@@ -10,10 +10,9 @@
     <p:sldId id="259" r:id="rId4"/>
     <p:sldId id="261" r:id="rId5"/>
     <p:sldId id="262" r:id="rId6"/>
-    <p:sldId id="263" r:id="rId7"/>
-    <p:sldId id="264" r:id="rId8"/>
-    <p:sldId id="265" r:id="rId9"/>
-    <p:sldId id="260" r:id="rId10"/>
+    <p:sldId id="264" r:id="rId7"/>
+    <p:sldId id="265" r:id="rId8"/>
+    <p:sldId id="260" r:id="rId9"/>
   </p:sldIdLst>
   <p:sldSz cx="12192000" cy="6858000"/>
   <p:notesSz cx="6858000" cy="9144000"/>
@@ -311,7 +310,7 @@
           <a:p>
             <a:fld id="{942A8CE7-507A-40A5-9479-CAF260EA3490}" type="datetimeFigureOut">
               <a:rPr lang="ro-RO" smtClean="0"/>
-              <a:t>06.06.2019</a:t>
+              <a:t>10.06.2019</a:t>
             </a:fld>
             <a:endParaRPr lang="ro-RO"/>
           </a:p>
@@ -747,7 +746,7 @@
           <a:p>
             <a:fld id="{942A8CE7-507A-40A5-9479-CAF260EA3490}" type="datetimeFigureOut">
               <a:rPr lang="ro-RO" smtClean="0"/>
-              <a:t>06.06.2019</a:t>
+              <a:t>10.06.2019</a:t>
             </a:fld>
             <a:endParaRPr lang="ro-RO"/>
           </a:p>
@@ -997,7 +996,7 @@
           <a:p>
             <a:fld id="{942A8CE7-507A-40A5-9479-CAF260EA3490}" type="datetimeFigureOut">
               <a:rPr lang="ro-RO" smtClean="0"/>
-              <a:t>06.06.2019</a:t>
+              <a:t>10.06.2019</a:t>
             </a:fld>
             <a:endParaRPr lang="ro-RO"/>
           </a:p>
@@ -1305,7 +1304,7 @@
           <a:p>
             <a:fld id="{942A8CE7-507A-40A5-9479-CAF260EA3490}" type="datetimeFigureOut">
               <a:rPr lang="ro-RO" smtClean="0"/>
-              <a:t>06.06.2019</a:t>
+              <a:t>10.06.2019</a:t>
             </a:fld>
             <a:endParaRPr lang="ro-RO"/>
           </a:p>
@@ -1623,7 +1622,7 @@
           <a:p>
             <a:fld id="{942A8CE7-507A-40A5-9479-CAF260EA3490}" type="datetimeFigureOut">
               <a:rPr lang="ro-RO" smtClean="0"/>
-              <a:t>06.06.2019</a:t>
+              <a:t>10.06.2019</a:t>
             </a:fld>
             <a:endParaRPr lang="ro-RO"/>
           </a:p>
@@ -1925,7 +1924,7 @@
           <a:p>
             <a:fld id="{942A8CE7-507A-40A5-9479-CAF260EA3490}" type="datetimeFigureOut">
               <a:rPr lang="ro-RO" smtClean="0"/>
-              <a:t>06.06.2019</a:t>
+              <a:t>10.06.2019</a:t>
             </a:fld>
             <a:endParaRPr lang="ro-RO"/>
           </a:p>
@@ -2292,7 +2291,7 @@
           <a:p>
             <a:fld id="{942A8CE7-507A-40A5-9479-CAF260EA3490}" type="datetimeFigureOut">
               <a:rPr lang="ro-RO" smtClean="0"/>
-              <a:t>06.06.2019</a:t>
+              <a:t>10.06.2019</a:t>
             </a:fld>
             <a:endParaRPr lang="ro-RO"/>
           </a:p>
@@ -2466,7 +2465,7 @@
           <a:p>
             <a:fld id="{942A8CE7-507A-40A5-9479-CAF260EA3490}" type="datetimeFigureOut">
               <a:rPr lang="ro-RO" smtClean="0"/>
-              <a:t>06.06.2019</a:t>
+              <a:t>10.06.2019</a:t>
             </a:fld>
             <a:endParaRPr lang="ro-RO"/>
           </a:p>
@@ -2646,7 +2645,7 @@
           <a:p>
             <a:fld id="{942A8CE7-507A-40A5-9479-CAF260EA3490}" type="datetimeFigureOut">
               <a:rPr lang="ro-RO" smtClean="0"/>
-              <a:t>06.06.2019</a:t>
+              <a:t>10.06.2019</a:t>
             </a:fld>
             <a:endParaRPr lang="ro-RO"/>
           </a:p>
@@ -2816,7 +2815,7 @@
           <a:p>
             <a:fld id="{942A8CE7-507A-40A5-9479-CAF260EA3490}" type="datetimeFigureOut">
               <a:rPr lang="ro-RO" smtClean="0"/>
-              <a:t>06.06.2019</a:t>
+              <a:t>10.06.2019</a:t>
             </a:fld>
             <a:endParaRPr lang="ro-RO"/>
           </a:p>
@@ -3066,7 +3065,7 @@
           <a:p>
             <a:fld id="{942A8CE7-507A-40A5-9479-CAF260EA3490}" type="datetimeFigureOut">
               <a:rPr lang="ro-RO" smtClean="0"/>
-              <a:t>06.06.2019</a:t>
+              <a:t>10.06.2019</a:t>
             </a:fld>
             <a:endParaRPr lang="ro-RO"/>
           </a:p>
@@ -3302,7 +3301,7 @@
           <a:p>
             <a:fld id="{942A8CE7-507A-40A5-9479-CAF260EA3490}" type="datetimeFigureOut">
               <a:rPr lang="ro-RO" smtClean="0"/>
-              <a:t>06.06.2019</a:t>
+              <a:t>10.06.2019</a:t>
             </a:fld>
             <a:endParaRPr lang="ro-RO"/>
           </a:p>
@@ -3684,7 +3683,7 @@
           <a:p>
             <a:fld id="{942A8CE7-507A-40A5-9479-CAF260EA3490}" type="datetimeFigureOut">
               <a:rPr lang="ro-RO" smtClean="0"/>
-              <a:t>06.06.2019</a:t>
+              <a:t>10.06.2019</a:t>
             </a:fld>
             <a:endParaRPr lang="ro-RO"/>
           </a:p>
@@ -3802,7 +3801,7 @@
           <a:p>
             <a:fld id="{942A8CE7-507A-40A5-9479-CAF260EA3490}" type="datetimeFigureOut">
               <a:rPr lang="ro-RO" smtClean="0"/>
-              <a:t>06.06.2019</a:t>
+              <a:t>10.06.2019</a:t>
             </a:fld>
             <a:endParaRPr lang="ro-RO"/>
           </a:p>
@@ -3897,7 +3896,7 @@
           <a:p>
             <a:fld id="{942A8CE7-507A-40A5-9479-CAF260EA3490}" type="datetimeFigureOut">
               <a:rPr lang="ro-RO" smtClean="0"/>
-              <a:t>06.06.2019</a:t>
+              <a:t>10.06.2019</a:t>
             </a:fld>
             <a:endParaRPr lang="ro-RO"/>
           </a:p>
@@ -4152,7 +4151,7 @@
           <a:p>
             <a:fld id="{942A8CE7-507A-40A5-9479-CAF260EA3490}" type="datetimeFigureOut">
               <a:rPr lang="ro-RO" smtClean="0"/>
-              <a:t>06.06.2019</a:t>
+              <a:t>10.06.2019</a:t>
             </a:fld>
             <a:endParaRPr lang="ro-RO"/>
           </a:p>
@@ -4435,7 +4434,7 @@
           <a:p>
             <a:fld id="{942A8CE7-507A-40A5-9479-CAF260EA3490}" type="datetimeFigureOut">
               <a:rPr lang="ro-RO" smtClean="0"/>
-              <a:t>06.06.2019</a:t>
+              <a:t>10.06.2019</a:t>
             </a:fld>
             <a:endParaRPr lang="ro-RO"/>
           </a:p>
@@ -4841,7 +4840,7 @@
           <a:p>
             <a:fld id="{942A8CE7-507A-40A5-9479-CAF260EA3490}" type="datetimeFigureOut">
               <a:rPr lang="ro-RO" smtClean="0"/>
-              <a:t>06.06.2019</a:t>
+              <a:t>10.06.2019</a:t>
             </a:fld>
             <a:endParaRPr lang="ro-RO"/>
           </a:p>
@@ -6087,7 +6086,7 @@
         </p:nvGraphicFramePr>
         <p:xfrm>
           <a:off x="795528" y="1088136"/>
-          <a:ext cx="10186416" cy="5450925"/>
+          <a:ext cx="10186416" cy="5548524"/>
         </p:xfrm>
         <a:graphic>
           <a:graphicData uri="http://schemas.openxmlformats.org/drawingml/2006/table">
@@ -11311,94 +11310,6 @@
       </p:grpSpPr>
       <p:sp>
         <p:nvSpPr>
-          <p:cNvPr id="2" name="Dreptunghi 1"/>
-          <p:cNvSpPr/>
-          <p:nvPr/>
-        </p:nvSpPr>
-        <p:spPr>
-          <a:xfrm>
-            <a:off x="622338" y="207187"/>
-            <a:ext cx="3171061" cy="646331"/>
-          </a:xfrm>
-          <a:prstGeom prst="rect">
-            <a:avLst/>
-          </a:prstGeom>
-        </p:spPr>
-        <p:txBody>
-          <a:bodyPr wrap="none">
-            <a:spAutoFit/>
-          </a:bodyPr>
-          <a:lstStyle/>
-          <a:p>
-            <a:r>
-              <a:rPr lang="ro-RO" sz="3600" cap="all" dirty="0" smtClean="0">
-                <a:ln w="3175" cmpd="sng">
-                  <a:noFill/>
-                </a:ln>
-                <a:solidFill>
-                  <a:prstClr val="white"/>
-                </a:solidFill>
-                <a:ea typeface="+mj-ea"/>
-                <a:cs typeface="+mj-cs"/>
-              </a:rPr>
-              <a:t>Testare </a:t>
-            </a:r>
-            <a:r>
-              <a:rPr lang="en-US" sz="3600" cap="all" dirty="0" smtClean="0">
-                <a:ln w="3175" cmpd="sng">
-                  <a:noFill/>
-                </a:ln>
-                <a:solidFill>
-                  <a:prstClr val="white"/>
-                </a:solidFill>
-                <a:ea typeface="+mj-ea"/>
-                <a:cs typeface="+mj-cs"/>
-              </a:rPr>
-              <a:t>cod</a:t>
-            </a:r>
-            <a:endParaRPr lang="ro-RO" dirty="0"/>
-          </a:p>
-        </p:txBody>
-      </p:sp>
-    </p:spTree>
-    <p:extLst>
-      <p:ext uri="{BB962C8B-B14F-4D97-AF65-F5344CB8AC3E}">
-        <p14:creationId xmlns:p14="http://schemas.microsoft.com/office/powerpoint/2010/main" val="4239020422"/>
-      </p:ext>
-    </p:extLst>
-  </p:cSld>
-  <p:clrMapOvr>
-    <a:masterClrMapping/>
-  </p:clrMapOvr>
-  <p:timing>
-    <p:tnLst>
-      <p:par>
-        <p:cTn id="1" dur="indefinite" restart="never" nodeType="tmRoot"/>
-      </p:par>
-    </p:tnLst>
-  </p:timing>
-</p:sld>
-</file>
-
-<file path=ppt/slides/slide7.xml><?xml version="1.0" encoding="utf-8"?>
-<p:sld xmlns:a="http://schemas.openxmlformats.org/drawingml/2006/main" xmlns:r="http://schemas.openxmlformats.org/officeDocument/2006/relationships" xmlns:p="http://schemas.openxmlformats.org/presentationml/2006/main">
-  <p:cSld>
-    <p:spTree>
-      <p:nvGrpSpPr>
-        <p:cNvPr id="1" name=""/>
-        <p:cNvGrpSpPr/>
-        <p:nvPr/>
-      </p:nvGrpSpPr>
-      <p:grpSpPr>
-        <a:xfrm>
-          <a:off x="0" y="0"/>
-          <a:ext cx="0" cy="0"/>
-          <a:chOff x="0" y="0"/>
-          <a:chExt cx="0" cy="0"/>
-        </a:xfrm>
-      </p:grpSpPr>
-      <p:sp>
-        <p:nvSpPr>
           <p:cNvPr id="2" name="Titlu 1"/>
           <p:cNvSpPr>
             <a:spLocks noGrp="1"/>
@@ -11557,7 +11468,7 @@
 </p:sld>
 </file>
 
-<file path=ppt/slides/slide8.xml><?xml version="1.0" encoding="utf-8"?>
+<file path=ppt/slides/slide7.xml><?xml version="1.0" encoding="utf-8"?>
 <p:sld xmlns:a="http://schemas.openxmlformats.org/drawingml/2006/main" xmlns:r="http://schemas.openxmlformats.org/officeDocument/2006/relationships" xmlns:p="http://schemas.openxmlformats.org/presentationml/2006/main">
   <p:cSld>
     <p:spTree>
@@ -11706,7 +11617,7 @@
 </p:sld>
 </file>
 
-<file path=ppt/slides/slide9.xml><?xml version="1.0" encoding="utf-8"?>
+<file path=ppt/slides/slide8.xml><?xml version="1.0" encoding="utf-8"?>
 <p:sld xmlns:a="http://schemas.openxmlformats.org/drawingml/2006/main" xmlns:r="http://schemas.openxmlformats.org/officeDocument/2006/relationships" xmlns:p="http://schemas.openxmlformats.org/presentationml/2006/main">
   <p:cSld>
     <p:spTree>

</xml_diff>